<commit_message>
feature added: extract meta data from tif/tiff
</commit_message>
<xml_diff>
--- a/Documentation/metadata.pptx
+++ b/Documentation/metadata.pptx
@@ -9,6 +9,7 @@
     <p:sldId id="258" r:id="rId3"/>
     <p:sldId id="259" r:id="rId4"/>
     <p:sldId id="260" r:id="rId5"/>
+    <p:sldId id="261" r:id="rId6"/>
   </p:sldIdLst>
   <p:sldSz cx="12192000" cy="6858000"/>
   <p:notesSz cx="6858000" cy="9144000"/>
@@ -344,6 +345,62 @@
     </pc:docChg>
   </pc:docChgLst>
   <pc:docChgLst>
+    <pc:chgData name="Ludwig Sembach" userId="f8993c4f9875f6c3" providerId="LiveId" clId="{6184488B-589B-46D8-8104-F1BE5E680235}"/>
+    <pc:docChg chg="custSel addSld modSld">
+      <pc:chgData name="Ludwig Sembach" userId="f8993c4f9875f6c3" providerId="LiveId" clId="{6184488B-589B-46D8-8104-F1BE5E680235}" dt="2022-06-13T19:31:11.481" v="15" actId="1076"/>
+      <pc:docMkLst>
+        <pc:docMk/>
+      </pc:docMkLst>
+      <pc:sldChg chg="addSp delSp modSp add mod">
+        <pc:chgData name="Ludwig Sembach" userId="f8993c4f9875f6c3" providerId="LiveId" clId="{6184488B-589B-46D8-8104-F1BE5E680235}" dt="2022-06-13T19:31:11.481" v="15" actId="1076"/>
+        <pc:sldMkLst>
+          <pc:docMk/>
+          <pc:sldMk cId="3775418318" sldId="261"/>
+        </pc:sldMkLst>
+        <pc:spChg chg="mod">
+          <ac:chgData name="Ludwig Sembach" userId="f8993c4f9875f6c3" providerId="LiveId" clId="{6184488B-589B-46D8-8104-F1BE5E680235}" dt="2022-06-13T19:30:21.220" v="8" actId="20577"/>
+          <ac:spMkLst>
+            <pc:docMk/>
+            <pc:sldMk cId="3775418318" sldId="261"/>
+            <ac:spMk id="2" creationId="{6CC4121A-FC3A-48C0-8DDC-6C9100556C57}"/>
+          </ac:spMkLst>
+        </pc:spChg>
+        <pc:picChg chg="del">
+          <ac:chgData name="Ludwig Sembach" userId="f8993c4f9875f6c3" providerId="LiveId" clId="{6184488B-589B-46D8-8104-F1BE5E680235}" dt="2022-06-13T19:30:23.913" v="10" actId="478"/>
+          <ac:picMkLst>
+            <pc:docMk/>
+            <pc:sldMk cId="3775418318" sldId="261"/>
+            <ac:picMk id="4" creationId="{2BD07797-9DBC-4543-BB3E-32D041E815BE}"/>
+          </ac:picMkLst>
+        </pc:picChg>
+        <pc:picChg chg="add mod">
+          <ac:chgData name="Ludwig Sembach" userId="f8993c4f9875f6c3" providerId="LiveId" clId="{6184488B-589B-46D8-8104-F1BE5E680235}" dt="2022-06-13T19:31:08.067" v="14" actId="1076"/>
+          <ac:picMkLst>
+            <pc:docMk/>
+            <pc:sldMk cId="3775418318" sldId="261"/>
+            <ac:picMk id="5" creationId="{D02C8654-10CD-9F41-D8FE-D5C933769C5A}"/>
+          </ac:picMkLst>
+        </pc:picChg>
+        <pc:picChg chg="del">
+          <ac:chgData name="Ludwig Sembach" userId="f8993c4f9875f6c3" providerId="LiveId" clId="{6184488B-589B-46D8-8104-F1BE5E680235}" dt="2022-06-13T19:30:23.310" v="9" actId="478"/>
+          <ac:picMkLst>
+            <pc:docMk/>
+            <pc:sldMk cId="3775418318" sldId="261"/>
+            <ac:picMk id="6" creationId="{3F4421BF-5D9F-4D02-84DB-6878CAFE58DA}"/>
+          </ac:picMkLst>
+        </pc:picChg>
+        <pc:picChg chg="add mod">
+          <ac:chgData name="Ludwig Sembach" userId="f8993c4f9875f6c3" providerId="LiveId" clId="{6184488B-589B-46D8-8104-F1BE5E680235}" dt="2022-06-13T19:31:11.481" v="15" actId="1076"/>
+          <ac:picMkLst>
+            <pc:docMk/>
+            <pc:sldMk cId="3775418318" sldId="261"/>
+            <ac:picMk id="8" creationId="{1A9182AD-CE17-2CF8-FC4E-3C6FBFB21D53}"/>
+          </ac:picMkLst>
+        </pc:picChg>
+      </pc:sldChg>
+    </pc:docChg>
+  </pc:docChgLst>
+  <pc:docChgLst>
     <pc:chgData name="Ludwig Sembach" userId="f8993c4f9875f6c3" providerId="LiveId" clId="{0B417544-2E41-4D8B-B0C8-495C71695BCD}"/>
     <pc:docChg chg="undo custSel modSld">
       <pc:chgData name="Ludwig Sembach" userId="f8993c4f9875f6c3" providerId="LiveId" clId="{0B417544-2E41-4D8B-B0C8-495C71695BCD}" dt="2022-02-09T20:14:19.847" v="60" actId="20577"/>
@@ -642,7 +699,7 @@
           <a:p>
             <a:fld id="{96DFF08F-DC6B-4601-B491-B0F83F6DD2DA}" type="datetimeFigureOut">
               <a:rPr lang="en-US" dirty="0"/>
-              <a:t>4/8/2022</a:t>
+              <a:t>6/13/2022</a:t>
             </a:fld>
             <a:endParaRPr lang="en-US" dirty="0"/>
           </a:p>
@@ -845,7 +902,7 @@
           <a:p>
             <a:fld id="{96DFF08F-DC6B-4601-B491-B0F83F6DD2DA}" type="datetimeFigureOut">
               <a:rPr lang="en-US" dirty="0"/>
-              <a:t>4/8/2022</a:t>
+              <a:t>6/13/2022</a:t>
             </a:fld>
             <a:endParaRPr lang="en-US" dirty="0"/>
           </a:p>
@@ -1096,7 +1153,7 @@
           <a:p>
             <a:fld id="{96DFF08F-DC6B-4601-B491-B0F83F6DD2DA}" type="datetimeFigureOut">
               <a:rPr lang="en-US" dirty="0"/>
-              <a:t>4/8/2022</a:t>
+              <a:t>6/13/2022</a:t>
             </a:fld>
             <a:endParaRPr lang="en-US" dirty="0"/>
           </a:p>
@@ -1261,7 +1318,7 @@
           <a:p>
             <a:fld id="{D62CEF3B-A037-46D0-B02C-1428F07E9383}" type="datetimeFigureOut">
               <a:rPr lang="en-US" dirty="0"/>
-              <a:t>4/8/2022</a:t>
+              <a:t>6/13/2022</a:t>
             </a:fld>
             <a:endParaRPr lang="en-US" dirty="0"/>
           </a:p>
@@ -1599,7 +1656,7 @@
           <a:p>
             <a:fld id="{96DFF08F-DC6B-4601-B491-B0F83F6DD2DA}" type="datetimeFigureOut">
               <a:rPr lang="en-US" dirty="0"/>
-              <a:t>4/8/2022</a:t>
+              <a:t>6/13/2022</a:t>
             </a:fld>
             <a:endParaRPr lang="en-US" dirty="0"/>
           </a:p>
@@ -1869,7 +1926,7 @@
           <a:p>
             <a:fld id="{96DFF08F-DC6B-4601-B491-B0F83F6DD2DA}" type="datetimeFigureOut">
               <a:rPr lang="en-US" dirty="0"/>
-              <a:t>4/8/2022</a:t>
+              <a:t>6/13/2022</a:t>
             </a:fld>
             <a:endParaRPr lang="en-US" dirty="0"/>
           </a:p>
@@ -2243,7 +2300,7 @@
           <a:p>
             <a:fld id="{96DFF08F-DC6B-4601-B491-B0F83F6DD2DA}" type="datetimeFigureOut">
               <a:rPr lang="en-US" dirty="0"/>
-              <a:t>4/8/2022</a:t>
+              <a:t>6/13/2022</a:t>
             </a:fld>
             <a:endParaRPr lang="en-US" dirty="0"/>
           </a:p>
@@ -2356,7 +2413,7 @@
           <a:p>
             <a:fld id="{96DFF08F-DC6B-4601-B491-B0F83F6DD2DA}" type="datetimeFigureOut">
               <a:rPr lang="en-US" dirty="0"/>
-              <a:t>4/8/2022</a:t>
+              <a:t>6/13/2022</a:t>
             </a:fld>
             <a:endParaRPr lang="en-US" dirty="0"/>
           </a:p>
@@ -2523,7 +2580,7 @@
             <a:fld id="{96DFF08F-DC6B-4601-B491-B0F83F6DD2DA}" type="datetimeFigureOut">
               <a:rPr lang="en-US" dirty="0"/>
               <a:pPr/>
-              <a:t>4/8/2022</a:t>
+              <a:t>6/13/2022</a:t>
             </a:fld>
             <a:endParaRPr lang="en-US" dirty="0"/>
           </a:p>
@@ -2874,7 +2931,7 @@
             <a:fld id="{96DFF08F-DC6B-4601-B491-B0F83F6DD2DA}" type="datetimeFigureOut">
               <a:rPr lang="en-US" dirty="0"/>
               <a:pPr/>
-              <a:t>4/8/2022</a:t>
+              <a:t>6/13/2022</a:t>
             </a:fld>
             <a:endParaRPr lang="en-US" dirty="0"/>
           </a:p>
@@ -3247,7 +3304,7 @@
           <a:p>
             <a:fld id="{96DFF08F-DC6B-4601-B491-B0F83F6DD2DA}" type="datetimeFigureOut">
               <a:rPr lang="en-US" dirty="0"/>
-              <a:t>4/8/2022</a:t>
+              <a:t>6/13/2022</a:t>
             </a:fld>
             <a:endParaRPr lang="en-US" dirty="0"/>
           </a:p>
@@ -3530,7 +3587,7 @@
             <a:fld id="{96DFF08F-DC6B-4601-B491-B0F83F6DD2DA}" type="datetimeFigureOut">
               <a:rPr lang="en-US" dirty="0"/>
               <a:pPr/>
-              <a:t>4/8/2022</a:t>
+              <a:t>6/13/2022</a:t>
             </a:fld>
             <a:endParaRPr lang="en-US" dirty="0"/>
           </a:p>
@@ -5170,6 +5227,133 @@
 </p:sld>
 </file>
 
+<file path=ppt/slides/slide5.xml><?xml version="1.0" encoding="utf-8"?>
+<p:sld xmlns:a="http://schemas.openxmlformats.org/drawingml/2006/main" xmlns:r="http://schemas.openxmlformats.org/officeDocument/2006/relationships" xmlns:p="http://schemas.openxmlformats.org/presentationml/2006/main">
+  <p:cSld>
+    <p:spTree>
+      <p:nvGrpSpPr>
+        <p:cNvPr id="1" name=""/>
+        <p:cNvGrpSpPr/>
+        <p:nvPr/>
+      </p:nvGrpSpPr>
+      <p:grpSpPr>
+        <a:xfrm>
+          <a:off x="0" y="0"/>
+          <a:ext cx="0" cy="0"/>
+          <a:chOff x="0" y="0"/>
+          <a:chExt cx="0" cy="0"/>
+        </a:xfrm>
+      </p:grpSpPr>
+      <p:sp>
+        <p:nvSpPr>
+          <p:cNvPr id="2" name="Title 1">
+            <a:extLst>
+              <a:ext uri="{FF2B5EF4-FFF2-40B4-BE49-F238E27FC236}">
+                <a16:creationId xmlns:a16="http://schemas.microsoft.com/office/drawing/2014/main" id="{6CC4121A-FC3A-48C0-8DDC-6C9100556C57}"/>
+              </a:ext>
+            </a:extLst>
+          </p:cNvPr>
+          <p:cNvSpPr>
+            <a:spLocks noGrp="1"/>
+          </p:cNvSpPr>
+          <p:nvPr>
+            <p:ph type="title"/>
+          </p:nvPr>
+        </p:nvSpPr>
+        <p:spPr/>
+        <p:txBody>
+          <a:bodyPr/>
+          <a:lstStyle/>
+          <a:p>
+            <a:r>
+              <a:rPr lang="en-US" dirty="0"/>
+              <a:t>Meta data tags for </a:t>
+            </a:r>
+            <a:r>
+              <a:rPr lang="en-US" dirty="0" err="1"/>
+              <a:t>tif</a:t>
+            </a:r>
+            <a:r>
+              <a:rPr lang="en-US" dirty="0"/>
+              <a:t>/tiff</a:t>
+            </a:r>
+            <a:endParaRPr lang="en-DE" dirty="0"/>
+          </a:p>
+        </p:txBody>
+      </p:sp>
+      <p:pic>
+        <p:nvPicPr>
+          <p:cNvPr id="5" name="Picture 4">
+            <a:extLst>
+              <a:ext uri="{FF2B5EF4-FFF2-40B4-BE49-F238E27FC236}">
+                <a16:creationId xmlns:a16="http://schemas.microsoft.com/office/drawing/2014/main" id="{D02C8654-10CD-9F41-D8FE-D5C933769C5A}"/>
+              </a:ext>
+            </a:extLst>
+          </p:cNvPr>
+          <p:cNvPicPr>
+            <a:picLocks noChangeAspect="1"/>
+          </p:cNvPicPr>
+          <p:nvPr/>
+        </p:nvPicPr>
+        <p:blipFill>
+          <a:blip r:embed="rId2"/>
+          <a:stretch>
+            <a:fillRect/>
+          </a:stretch>
+        </p:blipFill>
+        <p:spPr>
+          <a:xfrm>
+            <a:off x="1097280" y="2116456"/>
+            <a:ext cx="3296110" cy="2229161"/>
+          </a:xfrm>
+          <a:prstGeom prst="rect">
+            <a:avLst/>
+          </a:prstGeom>
+        </p:spPr>
+      </p:pic>
+      <p:pic>
+        <p:nvPicPr>
+          <p:cNvPr id="8" name="Picture 7">
+            <a:extLst>
+              <a:ext uri="{FF2B5EF4-FFF2-40B4-BE49-F238E27FC236}">
+                <a16:creationId xmlns:a16="http://schemas.microsoft.com/office/drawing/2014/main" id="{1A9182AD-CE17-2CF8-FC4E-3C6FBFB21D53}"/>
+              </a:ext>
+            </a:extLst>
+          </p:cNvPr>
+          <p:cNvPicPr>
+            <a:picLocks noChangeAspect="1"/>
+          </p:cNvPicPr>
+          <p:nvPr/>
+        </p:nvPicPr>
+        <p:blipFill>
+          <a:blip r:embed="rId3"/>
+          <a:stretch>
+            <a:fillRect/>
+          </a:stretch>
+        </p:blipFill>
+        <p:spPr>
+          <a:xfrm>
+            <a:off x="4633395" y="2116456"/>
+            <a:ext cx="3886742" cy="2162477"/>
+          </a:xfrm>
+          <a:prstGeom prst="rect">
+            <a:avLst/>
+          </a:prstGeom>
+        </p:spPr>
+      </p:pic>
+    </p:spTree>
+    <p:extLst>
+      <p:ext uri="{BB962C8B-B14F-4D97-AF65-F5344CB8AC3E}">
+        <p14:creationId xmlns:p14="http://schemas.microsoft.com/office/powerpoint/2010/main" val="3775418318"/>
+      </p:ext>
+    </p:extLst>
+  </p:cSld>
+  <p:clrMapOvr>
+    <a:masterClrMapping/>
+  </p:clrMapOvr>
+</p:sld>
+</file>
+
 <file path=ppt/theme/theme1.xml><?xml version="1.0" encoding="utf-8"?>
 <a:theme xmlns:a="http://schemas.openxmlformats.org/drawingml/2006/main" name="Retrospect">
   <a:themeElements>

</xml_diff>